<commit_message>
Sept. presentations Updated default presentations
</commit_message>
<xml_diff>
--- a/presentations/2099 Common/FHIR for Executives.pptx
+++ b/presentations/2099 Common/FHIR for Executives.pptx
@@ -329,7 +329,7 @@
             <a:fld id="{F976BA0D-8F11-41A0-82B4-C647E2FAE447}" type="datetimeFigureOut">
               <a:rPr lang="en-CA" smtClean="0"/>
               <a:pPr/>
-              <a:t>2017-05-07</a:t>
+              <a:t>2017-06-27</a:t>
             </a:fld>
             <a:endParaRPr lang="en-CA" dirty="0"/>
           </a:p>
@@ -496,7 +496,7 @@
             <a:fld id="{10B9A41D-2C14-4FD9-A8FE-469DBFAB3809}" type="datetimeFigureOut">
               <a:rPr lang="en-CA" smtClean="0"/>
               <a:pPr/>
-              <a:t>2017-05-07</a:t>
+              <a:t>2017-06-27</a:t>
             </a:fld>
             <a:endParaRPr lang="en-CA" dirty="0"/>
           </a:p>
@@ -9309,8 +9309,12 @@
           </a:p>
           <a:p>
             <a:r>
-              <a:rPr lang="en-US" noProof="0" dirty="0"/>
-              <a:t>April 27, 2017</a:t>
+              <a:rPr lang="en-US" dirty="0"/>
+              <a:t>June</a:t>
+            </a:r>
+            <a:r>
+              <a:rPr lang="en-US" noProof="0" dirty="0"/>
+              <a:t> 6, 2017</a:t>
             </a:r>
           </a:p>
         </p:txBody>
@@ -11961,7 +11965,7 @@
               <a:rPr lang="en-US" sz="2400" dirty="0">
                 <a:hlinkClick r:id="rId3"/>
               </a:rPr>
-              <a:t>http://gforge.hl7.org/svn/fhir/trunk/presentations/2017-04%20FHIR%20North/FHIR%20for%20Executives.pptx</a:t>
+              <a:t>http://gforge.hl7.org/svn/fhir/trunk/presentations/2017-06%20NYC/FHIR%20for%20Executives.pptx</a:t>
             </a:r>
             <a:endParaRPr lang="en-US" sz="2400" dirty="0"/>
           </a:p>
@@ -21380,7 +21384,7 @@
 </file>
 
 <file path=ppt/slides/slide5.xml><?xml version="1.0" encoding="utf-8"?>
-<p:sld xmlns:a="http://schemas.openxmlformats.org/drawingml/2006/main" xmlns:r="http://schemas.openxmlformats.org/officeDocument/2006/relationships" xmlns:p="http://schemas.openxmlformats.org/presentationml/2006/main" show="0">
+<p:sld xmlns:a="http://schemas.openxmlformats.org/drawingml/2006/main" xmlns:r="http://schemas.openxmlformats.org/officeDocument/2006/relationships" xmlns:p="http://schemas.openxmlformats.org/presentationml/2006/main">
   <p:cSld>
     <p:spTree>
       <p:nvGrpSpPr>
@@ -22037,6 +22041,274 @@
 </file>
 
 <file path=ppt/slides/slide53.xml><?xml version="1.0" encoding="utf-8"?>
+<p:sld xmlns:a="http://schemas.openxmlformats.org/drawingml/2006/main" xmlns:r="http://schemas.openxmlformats.org/officeDocument/2006/relationships" xmlns:p="http://schemas.openxmlformats.org/presentationml/2006/main">
+  <p:cSld>
+    <p:spTree>
+      <p:nvGrpSpPr>
+        <p:cNvPr id="1" name=""/>
+        <p:cNvGrpSpPr/>
+        <p:nvPr/>
+      </p:nvGrpSpPr>
+      <p:grpSpPr>
+        <a:xfrm>
+          <a:off x="0" y="0"/>
+          <a:ext cx="0" cy="0"/>
+          <a:chOff x="0" y="0"/>
+          <a:chExt cx="0" cy="0"/>
+        </a:xfrm>
+      </p:grpSpPr>
+      <p:sp>
+        <p:nvSpPr>
+          <p:cNvPr id="2" name="Title 1"/>
+          <p:cNvSpPr>
+            <a:spLocks noGrp="1"/>
+          </p:cNvSpPr>
+          <p:nvPr>
+            <p:ph type="title"/>
+          </p:nvPr>
+        </p:nvSpPr>
+        <p:spPr/>
+        <p:txBody>
+          <a:bodyPr/>
+          <a:lstStyle/>
+          <a:p>
+            <a:r>
+              <a:rPr lang="en-US" noProof="0" dirty="0"/>
+              <a:t>Break!</a:t>
+            </a:r>
+          </a:p>
+        </p:txBody>
+      </p:sp>
+    </p:spTree>
+  </p:cSld>
+  <p:clrMapOvr>
+    <a:masterClrMapping/>
+  </p:clrMapOvr>
+</p:sld>
+</file>
+
+<file path=ppt/slides/slide54.xml><?xml version="1.0" encoding="utf-8"?>
+<p:sld xmlns:a="http://schemas.openxmlformats.org/drawingml/2006/main" xmlns:r="http://schemas.openxmlformats.org/officeDocument/2006/relationships" xmlns:p="http://schemas.openxmlformats.org/presentationml/2006/main">
+  <p:cSld>
+    <p:spTree>
+      <p:nvGrpSpPr>
+        <p:cNvPr id="1" name=""/>
+        <p:cNvGrpSpPr/>
+        <p:nvPr/>
+      </p:nvGrpSpPr>
+      <p:grpSpPr>
+        <a:xfrm>
+          <a:off x="0" y="0"/>
+          <a:ext cx="0" cy="0"/>
+          <a:chOff x="0" y="0"/>
+          <a:chExt cx="0" cy="0"/>
+        </a:xfrm>
+      </p:grpSpPr>
+      <p:sp>
+        <p:nvSpPr>
+          <p:cNvPr id="2" name="Title 1"/>
+          <p:cNvSpPr>
+            <a:spLocks noGrp="1"/>
+          </p:cNvSpPr>
+          <p:nvPr>
+            <p:ph type="title"/>
+          </p:nvPr>
+        </p:nvSpPr>
+        <p:spPr/>
+        <p:txBody>
+          <a:bodyPr/>
+          <a:lstStyle/>
+          <a:p>
+            <a:r>
+              <a:rPr lang="en-US" noProof="0" dirty="0"/>
+              <a:t>Outline</a:t>
+            </a:r>
+          </a:p>
+        </p:txBody>
+      </p:sp>
+      <p:sp>
+        <p:nvSpPr>
+          <p:cNvPr id="5" name="Text Placeholder 4"/>
+          <p:cNvSpPr>
+            <a:spLocks noGrp="1"/>
+          </p:cNvSpPr>
+          <p:nvPr>
+            <p:ph type="body" idx="1"/>
+          </p:nvPr>
+        </p:nvSpPr>
+        <p:spPr/>
+        <p:txBody>
+          <a:bodyPr/>
+          <a:lstStyle/>
+          <a:p>
+            <a:r>
+              <a:rPr lang="en-US" noProof="0" dirty="0"/>
+              <a:t>Before break	</a:t>
+            </a:r>
+          </a:p>
+        </p:txBody>
+      </p:sp>
+      <p:sp>
+        <p:nvSpPr>
+          <p:cNvPr id="6" name="Content Placeholder 5"/>
+          <p:cNvSpPr>
+            <a:spLocks noGrp="1"/>
+          </p:cNvSpPr>
+          <p:nvPr>
+            <p:ph sz="half" idx="2"/>
+          </p:nvPr>
+        </p:nvSpPr>
+        <p:spPr/>
+        <p:txBody>
+          <a:bodyPr/>
+          <a:lstStyle/>
+          <a:p>
+            <a:r>
+              <a:rPr lang="en-US" noProof="0" dirty="0"/>
+              <a:t>Why FHIR?</a:t>
+            </a:r>
+          </a:p>
+          <a:p>
+            <a:r>
+              <a:rPr lang="en-US" noProof="0" dirty="0"/>
+              <a:t>What makes FHIR different?</a:t>
+            </a:r>
+          </a:p>
+          <a:p>
+            <a:pPr lvl="1"/>
+            <a:r>
+              <a:rPr lang="en-US" noProof="0" dirty="0"/>
+              <a:t>Core principles</a:t>
+            </a:r>
+          </a:p>
+          <a:p>
+            <a:r>
+              <a:rPr lang="en-US" noProof="0" dirty="0"/>
+              <a:t>Power of an interface</a:t>
+            </a:r>
+          </a:p>
+          <a:p>
+            <a:r>
+              <a:rPr lang="en-US" noProof="0" dirty="0"/>
+              <a:t>FHIR Resources</a:t>
+            </a:r>
+          </a:p>
+          <a:p>
+            <a:pPr marL="0" indent="0">
+              <a:buNone/>
+            </a:pPr>
+            <a:endParaRPr lang="en-US" noProof="0" dirty="0"/>
+          </a:p>
+        </p:txBody>
+      </p:sp>
+      <p:sp>
+        <p:nvSpPr>
+          <p:cNvPr id="7" name="Text Placeholder 6"/>
+          <p:cNvSpPr>
+            <a:spLocks noGrp="1"/>
+          </p:cNvSpPr>
+          <p:nvPr>
+            <p:ph type="body" sz="quarter" idx="3"/>
+          </p:nvPr>
+        </p:nvSpPr>
+        <p:spPr/>
+        <p:txBody>
+          <a:bodyPr/>
+          <a:lstStyle/>
+          <a:p>
+            <a:r>
+              <a:rPr lang="en-US" noProof="0" dirty="0"/>
+              <a:t>After break</a:t>
+            </a:r>
+          </a:p>
+        </p:txBody>
+      </p:sp>
+      <p:sp>
+        <p:nvSpPr>
+          <p:cNvPr id="8" name="Content Placeholder 7"/>
+          <p:cNvSpPr>
+            <a:spLocks noGrp="1"/>
+          </p:cNvSpPr>
+          <p:nvPr>
+            <p:ph sz="quarter" idx="4"/>
+          </p:nvPr>
+        </p:nvSpPr>
+        <p:spPr/>
+        <p:txBody>
+          <a:bodyPr/>
+          <a:lstStyle/>
+          <a:p>
+            <a:r>
+              <a:rPr lang="en-US" noProof="0" dirty="0"/>
+              <a:t>How does FHIR Compare?</a:t>
+            </a:r>
+          </a:p>
+          <a:p>
+            <a:r>
+              <a:rPr lang="en-US" noProof="0" dirty="0"/>
+              <a:t>FHIR Status</a:t>
+            </a:r>
+          </a:p>
+          <a:p>
+            <a:r>
+              <a:rPr lang="en-US" noProof="0" dirty="0"/>
+              <a:t>Where is FHIR being used?</a:t>
+            </a:r>
+          </a:p>
+          <a:p>
+            <a:r>
+              <a:rPr lang="en-US" noProof="0" dirty="0"/>
+              <a:t>Risks &amp; Next steps</a:t>
+            </a:r>
+          </a:p>
+        </p:txBody>
+      </p:sp>
+      <p:sp>
+        <p:nvSpPr>
+          <p:cNvPr id="4" name="Slide Number Placeholder 3"/>
+          <p:cNvSpPr>
+            <a:spLocks noGrp="1"/>
+          </p:cNvSpPr>
+          <p:nvPr>
+            <p:ph type="sldNum" sz="quarter" idx="10"/>
+          </p:nvPr>
+        </p:nvSpPr>
+        <p:spPr>
+          <a:xfrm>
+            <a:off x="0" y="6303963"/>
+            <a:ext cx="720725" cy="220662"/>
+          </a:xfrm>
+          <a:prstGeom prst="rect">
+            <a:avLst/>
+          </a:prstGeom>
+        </p:spPr>
+        <p:txBody>
+          <a:bodyPr/>
+          <a:lstStyle/>
+          <a:p>
+            <a:fld id="{5CC3E5C4-3E2B-40F1-9F2B-C46CEB0C88DF}" type="slidenum">
+              <a:rPr lang="en-CA" smtClean="0"/>
+              <a:pPr/>
+              <a:t>54</a:t>
+            </a:fld>
+            <a:endParaRPr lang="en-CA" dirty="0"/>
+          </a:p>
+        </p:txBody>
+      </p:sp>
+    </p:spTree>
+    <p:extLst>
+      <p:ext uri="{BB962C8B-B14F-4D97-AF65-F5344CB8AC3E}">
+        <p14:creationId xmlns:p14="http://schemas.microsoft.com/office/powerpoint/2010/main" val="861047595"/>
+      </p:ext>
+    </p:extLst>
+  </p:cSld>
+  <p:clrMapOvr>
+    <a:masterClrMapping/>
+  </p:clrMapOvr>
+</p:sld>
+</file>
+
+<file path=ppt/slides/slide55.xml><?xml version="1.0" encoding="utf-8"?>
 <p:sld xmlns:a="http://schemas.openxmlformats.org/drawingml/2006/main" xmlns:r="http://schemas.openxmlformats.org/officeDocument/2006/relationships" xmlns:p="http://schemas.openxmlformats.org/presentationml/2006/main" show="0">
   <p:cSld>
     <p:spTree>
@@ -22070,274 +22342,6 @@
           <a:p>
             <a:r>
               <a:rPr lang="en-US" noProof="0" dirty="0"/>
-              <a:t>Break!</a:t>
-            </a:r>
-          </a:p>
-        </p:txBody>
-      </p:sp>
-    </p:spTree>
-  </p:cSld>
-  <p:clrMapOvr>
-    <a:masterClrMapping/>
-  </p:clrMapOvr>
-</p:sld>
-</file>
-
-<file path=ppt/slides/slide54.xml><?xml version="1.0" encoding="utf-8"?>
-<p:sld xmlns:a="http://schemas.openxmlformats.org/drawingml/2006/main" xmlns:r="http://schemas.openxmlformats.org/officeDocument/2006/relationships" xmlns:p="http://schemas.openxmlformats.org/presentationml/2006/main" show="0">
-  <p:cSld>
-    <p:spTree>
-      <p:nvGrpSpPr>
-        <p:cNvPr id="1" name=""/>
-        <p:cNvGrpSpPr/>
-        <p:nvPr/>
-      </p:nvGrpSpPr>
-      <p:grpSpPr>
-        <a:xfrm>
-          <a:off x="0" y="0"/>
-          <a:ext cx="0" cy="0"/>
-          <a:chOff x="0" y="0"/>
-          <a:chExt cx="0" cy="0"/>
-        </a:xfrm>
-      </p:grpSpPr>
-      <p:sp>
-        <p:nvSpPr>
-          <p:cNvPr id="2" name="Title 1"/>
-          <p:cNvSpPr>
-            <a:spLocks noGrp="1"/>
-          </p:cNvSpPr>
-          <p:nvPr>
-            <p:ph type="title"/>
-          </p:nvPr>
-        </p:nvSpPr>
-        <p:spPr/>
-        <p:txBody>
-          <a:bodyPr/>
-          <a:lstStyle/>
-          <a:p>
-            <a:r>
-              <a:rPr lang="en-US" noProof="0" dirty="0"/>
-              <a:t>Outline</a:t>
-            </a:r>
-          </a:p>
-        </p:txBody>
-      </p:sp>
-      <p:sp>
-        <p:nvSpPr>
-          <p:cNvPr id="5" name="Text Placeholder 4"/>
-          <p:cNvSpPr>
-            <a:spLocks noGrp="1"/>
-          </p:cNvSpPr>
-          <p:nvPr>
-            <p:ph type="body" idx="1"/>
-          </p:nvPr>
-        </p:nvSpPr>
-        <p:spPr/>
-        <p:txBody>
-          <a:bodyPr/>
-          <a:lstStyle/>
-          <a:p>
-            <a:r>
-              <a:rPr lang="en-US" noProof="0" dirty="0"/>
-              <a:t>Before break	</a:t>
-            </a:r>
-          </a:p>
-        </p:txBody>
-      </p:sp>
-      <p:sp>
-        <p:nvSpPr>
-          <p:cNvPr id="6" name="Content Placeholder 5"/>
-          <p:cNvSpPr>
-            <a:spLocks noGrp="1"/>
-          </p:cNvSpPr>
-          <p:nvPr>
-            <p:ph sz="half" idx="2"/>
-          </p:nvPr>
-        </p:nvSpPr>
-        <p:spPr/>
-        <p:txBody>
-          <a:bodyPr/>
-          <a:lstStyle/>
-          <a:p>
-            <a:r>
-              <a:rPr lang="en-US" noProof="0" dirty="0"/>
-              <a:t>Why FHIR?</a:t>
-            </a:r>
-          </a:p>
-          <a:p>
-            <a:r>
-              <a:rPr lang="en-US" noProof="0" dirty="0"/>
-              <a:t>What makes FHIR different?</a:t>
-            </a:r>
-          </a:p>
-          <a:p>
-            <a:pPr lvl="1"/>
-            <a:r>
-              <a:rPr lang="en-US" noProof="0" dirty="0"/>
-              <a:t>Core principles</a:t>
-            </a:r>
-          </a:p>
-          <a:p>
-            <a:r>
-              <a:rPr lang="en-US" noProof="0" dirty="0"/>
-              <a:t>Power of an interface</a:t>
-            </a:r>
-          </a:p>
-          <a:p>
-            <a:r>
-              <a:rPr lang="en-US" noProof="0" dirty="0"/>
-              <a:t>FHIR Resources</a:t>
-            </a:r>
-          </a:p>
-          <a:p>
-            <a:pPr marL="0" indent="0">
-              <a:buNone/>
-            </a:pPr>
-            <a:endParaRPr lang="en-US" noProof="0" dirty="0"/>
-          </a:p>
-        </p:txBody>
-      </p:sp>
-      <p:sp>
-        <p:nvSpPr>
-          <p:cNvPr id="7" name="Text Placeholder 6"/>
-          <p:cNvSpPr>
-            <a:spLocks noGrp="1"/>
-          </p:cNvSpPr>
-          <p:nvPr>
-            <p:ph type="body" sz="quarter" idx="3"/>
-          </p:nvPr>
-        </p:nvSpPr>
-        <p:spPr/>
-        <p:txBody>
-          <a:bodyPr/>
-          <a:lstStyle/>
-          <a:p>
-            <a:r>
-              <a:rPr lang="en-US" noProof="0" dirty="0"/>
-              <a:t>After break</a:t>
-            </a:r>
-          </a:p>
-        </p:txBody>
-      </p:sp>
-      <p:sp>
-        <p:nvSpPr>
-          <p:cNvPr id="8" name="Content Placeholder 7"/>
-          <p:cNvSpPr>
-            <a:spLocks noGrp="1"/>
-          </p:cNvSpPr>
-          <p:nvPr>
-            <p:ph sz="quarter" idx="4"/>
-          </p:nvPr>
-        </p:nvSpPr>
-        <p:spPr/>
-        <p:txBody>
-          <a:bodyPr/>
-          <a:lstStyle/>
-          <a:p>
-            <a:r>
-              <a:rPr lang="en-US" noProof="0" dirty="0"/>
-              <a:t>How does FHIR Compare?</a:t>
-            </a:r>
-          </a:p>
-          <a:p>
-            <a:r>
-              <a:rPr lang="en-US" noProof="0" dirty="0"/>
-              <a:t>FHIR Status</a:t>
-            </a:r>
-          </a:p>
-          <a:p>
-            <a:r>
-              <a:rPr lang="en-US" noProof="0" dirty="0"/>
-              <a:t>Where is FHIR being used?</a:t>
-            </a:r>
-          </a:p>
-          <a:p>
-            <a:r>
-              <a:rPr lang="en-US" noProof="0" dirty="0"/>
-              <a:t>Risks &amp; Next steps</a:t>
-            </a:r>
-          </a:p>
-        </p:txBody>
-      </p:sp>
-      <p:sp>
-        <p:nvSpPr>
-          <p:cNvPr id="4" name="Slide Number Placeholder 3"/>
-          <p:cNvSpPr>
-            <a:spLocks noGrp="1"/>
-          </p:cNvSpPr>
-          <p:nvPr>
-            <p:ph type="sldNum" sz="quarter" idx="10"/>
-          </p:nvPr>
-        </p:nvSpPr>
-        <p:spPr>
-          <a:xfrm>
-            <a:off x="0" y="6303963"/>
-            <a:ext cx="720725" cy="220662"/>
-          </a:xfrm>
-          <a:prstGeom prst="rect">
-            <a:avLst/>
-          </a:prstGeom>
-        </p:spPr>
-        <p:txBody>
-          <a:bodyPr/>
-          <a:lstStyle/>
-          <a:p>
-            <a:fld id="{5CC3E5C4-3E2B-40F1-9F2B-C46CEB0C88DF}" type="slidenum">
-              <a:rPr lang="en-CA" smtClean="0"/>
-              <a:pPr/>
-              <a:t>54</a:t>
-            </a:fld>
-            <a:endParaRPr lang="en-CA" dirty="0"/>
-          </a:p>
-        </p:txBody>
-      </p:sp>
-    </p:spTree>
-    <p:extLst>
-      <p:ext uri="{BB962C8B-B14F-4D97-AF65-F5344CB8AC3E}">
-        <p14:creationId xmlns:p14="http://schemas.microsoft.com/office/powerpoint/2010/main" val="861047595"/>
-      </p:ext>
-    </p:extLst>
-  </p:cSld>
-  <p:clrMapOvr>
-    <a:masterClrMapping/>
-  </p:clrMapOvr>
-</p:sld>
-</file>
-
-<file path=ppt/slides/slide55.xml><?xml version="1.0" encoding="utf-8"?>
-<p:sld xmlns:a="http://schemas.openxmlformats.org/drawingml/2006/main" xmlns:r="http://schemas.openxmlformats.org/officeDocument/2006/relationships" xmlns:p="http://schemas.openxmlformats.org/presentationml/2006/main">
-  <p:cSld>
-    <p:spTree>
-      <p:nvGrpSpPr>
-        <p:cNvPr id="1" name=""/>
-        <p:cNvGrpSpPr/>
-        <p:nvPr/>
-      </p:nvGrpSpPr>
-      <p:grpSpPr>
-        <a:xfrm>
-          <a:off x="0" y="0"/>
-          <a:ext cx="0" cy="0"/>
-          <a:chOff x="0" y="0"/>
-          <a:chExt cx="0" cy="0"/>
-        </a:xfrm>
-      </p:grpSpPr>
-      <p:sp>
-        <p:nvSpPr>
-          <p:cNvPr id="2" name="Title 1"/>
-          <p:cNvSpPr>
-            <a:spLocks noGrp="1"/>
-          </p:cNvSpPr>
-          <p:nvPr>
-            <p:ph type="title"/>
-          </p:nvPr>
-        </p:nvSpPr>
-        <p:spPr/>
-        <p:txBody>
-          <a:bodyPr/>
-          <a:lstStyle/>
-          <a:p>
-            <a:r>
-              <a:rPr lang="en-US" noProof="0" dirty="0"/>
               <a:t>Outline</a:t>
             </a:r>
           </a:p>
@@ -22526,7 +22530,7 @@
 </file>
 
 <file path=ppt/slides/slide56.xml><?xml version="1.0" encoding="utf-8"?>
-<p:sld xmlns:a="http://schemas.openxmlformats.org/drawingml/2006/main" xmlns:r="http://schemas.openxmlformats.org/officeDocument/2006/relationships" xmlns:p="http://schemas.openxmlformats.org/presentationml/2006/main">
+<p:sld xmlns:a="http://schemas.openxmlformats.org/drawingml/2006/main" xmlns:r="http://schemas.openxmlformats.org/officeDocument/2006/relationships" xmlns:p="http://schemas.openxmlformats.org/presentationml/2006/main" show="0">
   <p:cSld>
     <p:spTree>
       <p:nvGrpSpPr>
@@ -22713,7 +22717,7 @@
 </file>
 
 <file path=ppt/slides/slide57.xml><?xml version="1.0" encoding="utf-8"?>
-<p:sld xmlns:a="http://schemas.openxmlformats.org/drawingml/2006/main" xmlns:r="http://schemas.openxmlformats.org/officeDocument/2006/relationships" xmlns:p="http://schemas.openxmlformats.org/presentationml/2006/main">
+<p:sld xmlns:a="http://schemas.openxmlformats.org/drawingml/2006/main" xmlns:r="http://schemas.openxmlformats.org/officeDocument/2006/relationships" xmlns:p="http://schemas.openxmlformats.org/presentationml/2006/main" show="0">
   <p:cSld>
     <p:spTree>
       <p:nvGrpSpPr>
@@ -22805,7 +22809,7 @@
 </file>
 
 <file path=ppt/slides/slide58.xml><?xml version="1.0" encoding="utf-8"?>
-<p:sld xmlns:a="http://schemas.openxmlformats.org/drawingml/2006/main" xmlns:r="http://schemas.openxmlformats.org/officeDocument/2006/relationships" xmlns:p="http://schemas.openxmlformats.org/presentationml/2006/main">
+<p:sld xmlns:a="http://schemas.openxmlformats.org/drawingml/2006/main" xmlns:r="http://schemas.openxmlformats.org/officeDocument/2006/relationships" xmlns:p="http://schemas.openxmlformats.org/presentationml/2006/main" show="0">
   <p:cSld>
     <p:spTree>
       <p:nvGrpSpPr>
@@ -23097,7 +23101,7 @@
 </file>
 
 <file path=ppt/slides/slide6.xml><?xml version="1.0" encoding="utf-8"?>
-<p:sld xmlns:a="http://schemas.openxmlformats.org/drawingml/2006/main" xmlns:r="http://schemas.openxmlformats.org/officeDocument/2006/relationships" xmlns:p="http://schemas.openxmlformats.org/presentationml/2006/main">
+<p:sld xmlns:a="http://schemas.openxmlformats.org/drawingml/2006/main" xmlns:r="http://schemas.openxmlformats.org/officeDocument/2006/relationships" xmlns:p="http://schemas.openxmlformats.org/presentationml/2006/main" show="0">
   <p:cSld>
     <p:spTree>
       <p:nvGrpSpPr>
@@ -25513,7 +25517,7 @@
         </p:nvCxnSpPr>
         <p:spPr bwMode="auto">
           <a:xfrm>
-            <a:off x="6084168" y="2164794"/>
+            <a:off x="6263186" y="2164794"/>
             <a:ext cx="0" cy="2808312"/>
           </a:xfrm>
           <a:prstGeom prst="line">
@@ -30703,21 +30707,16 @@
           <a:p>
             <a:pPr lvl="1"/>
             <a:r>
+              <a:rPr lang="en-US" sz="1900" dirty="0"/>
+              <a:t>Sep 8-15 San Diego</a:t>
+            </a:r>
+          </a:p>
+          <a:p>
+            <a:pPr lvl="1"/>
+            <a:r>
               <a:rPr lang="en-US" sz="1900" noProof="0" dirty="0"/>
-              <a:t>May 5-12 Madrid</a:t>
-            </a:r>
-          </a:p>
-          <a:p>
-            <a:pPr lvl="1"/>
-            <a:r>
-              <a:rPr lang="en-US" sz="1900"/>
-              <a:t>Sep 8-15 San </a:t>
-            </a:r>
-            <a:r>
-              <a:rPr lang="en-US" sz="1900" dirty="0"/>
-              <a:t>Diego</a:t>
-            </a:r>
-            <a:endParaRPr lang="en-US" sz="1900" noProof="0" dirty="0"/>
+              <a:t>Jan 25-Feb 2 New Orleans</a:t>
+            </a:r>
           </a:p>
           <a:p>
             <a:r>
@@ -30744,13 +30743,6 @@
             <a:r>
               <a:rPr lang="en-US" sz="2400" noProof="0" dirty="0"/>
               <a:t>FHIR Institute Webinars</a:t>
-            </a:r>
-          </a:p>
-          <a:p>
-            <a:pPr lvl="1"/>
-            <a:r>
-              <a:rPr lang="en-US" sz="1900" noProof="0" dirty="0"/>
-              <a:t>Feb 13-17</a:t>
             </a:r>
           </a:p>
           <a:p>
@@ -30959,7 +30951,7 @@
                   <a:schemeClr val="accent1"/>
                 </a:solidFill>
               </a:rPr>
-              <a:t>November 16-18, 2016 in Amsterdam</a:t>
+              <a:t>November 16-18, 2017 in Amsterdam</a:t>
             </a:r>
             <a:endParaRPr lang="en-CA" sz="2800" b="1" dirty="0">
               <a:solidFill>
@@ -30998,14 +30990,14 @@
             <a:pPr lvl="1"/>
             <a:r>
               <a:rPr lang="en-US" sz="2000" dirty="0"/>
-              <a:t>12 speakers</a:t>
+              <a:t>26 speakers</a:t>
             </a:r>
           </a:p>
           <a:p>
             <a:pPr lvl="1"/>
             <a:r>
               <a:rPr lang="en-US" sz="2000" dirty="0"/>
-              <a:t>16 tutorials/presentations</a:t>
+              <a:t>61 tutorials/presentations</a:t>
             </a:r>
           </a:p>
           <a:p>
@@ -31216,9 +31208,48 @@
           </a:extLst>
         </p:spPr>
       </p:pic>
+      <p:sp>
+        <p:nvSpPr>
+          <p:cNvPr id="7" name="AutoShape 10" descr="data:image/jpeg;base64,/9j/4AAQSkZJRgABAQAAAQABAAD/2wCEAAkGBxQHBhIUBxMUFhIXGSIZFxcXFxgcGhwfFxccIB8cGh8gHTQgGB8mIRwbIjEhJSkvLjouHCAzODUsNygtLisBCgoKBQUFDgUFDisZExkrKysrKysrKysrKysrKysrKysrKysrKysrKysrKysrKysrKysrKysrKysrKysrKysrK//AABEIALcBEwMBIgACEQEDEQH/xAAcAAEAAgMBAQEAAAAAAAAAAAAABwgEBQYDAQL/xABHEAABAwIEAwQFBwkGBwEAAAABAAIDBBEFBhIhBzFRE0FhcRUiMoGRCBRSYnKhoiNCU4KSk7Gy0RYXM2PB0yU1Q3Oj0vAk/8QAFAEBAAAAAAAAAAAAAAAAAAAAAP/EABQRAQAAAAAAAAAAAAAAAAAAAAD/2gAMAwEAAhEDEQA/AJwREQEREBERAREQEREBERAREQEREBERAREQEREBERAREQEREBERAREQEREBERAREQEREBERAREQEREBERAREQEREBERAREQEREBERAREQEREBERAREQEREBERAREQEREBERAREQEREBERAREQEREBERAREQEREBERAREQEREBERAREQEREBERAREQEREBERAREQEREBERAREQEREBERAREQEREBERAREQEREBERAREQEREBERAXK55z7TZJEPpVszjLq0iJrSfU03J1PFvaH3rqlW75Q2J/O87MiadoIWgjo55Lj+EsQd5/fzh36Gt/dw/7y32TOJ9JnHFjBhkdQ14YX3kbGG2aWj82Qm/rDuVVFJnyfHac/nxgePvYf9EFllGWIccMOoq6SPs6p+hxbrYyIsdpNrtJlBIPcbLc8W8z/wBmMmyugNp5fyUXUFwN3fqtub9dPVVRQWN/v5w79DW/u4f95dBX8TKWgyjT19RHUdjO8sYzTH2m2v1iO0tp9Q76u9vVVSVl8z8MH5iyzhtMypELaWLS4dnr1uLGAn2ha2l37RQYv9/OHfoa393D/vKU4n9pEDYi4vY8xccj4qFcO4B/NcQifPWtexr2uczsCNQa4Etv2m1xteymxAReVRUspheoe1o+s4D+K+U9UypH/wCZ7HfZcD/BB7IiICIvhcA4AkXPJB9Rfl7xGwmQgAcydgtQ/NtBHLpfXUgdysaiK9+ltSDcovOCdtREHU7muaeRaQQfIheiAi/MkgiYTIQAOZJsAtNLnDD4XkS19ICOYM8Vx5+tsg3aLCw7F6fFBfDJ4ZR/lyMf/KVmoCIsHEcZp8L/AOZ1EMX/AHJGM/mKDORa/D8dpcUfbDamCU9I5WPP4StggLmMx8QMPy3UGPFalolHONoc9w2v6waDp233tzWVnnG/7OZSqqlltUbPUuLjW4hrLjvGpwVPZpXTzOdO4uc4kuc4kkkm5JJ3JJ70FqsA4o4fj+LR0+GvlMshIaDG4A2aSd+7YErtVD/B7hv6EbBiWIy+u6IvbFp2YJG7EuJuToO4sLXI3UMYtmmpr8UmlZUTtEkjnholeANTibAA2Fr2QXHRRvwFildkkzV73vdNK4tL3OcdLLMtufpNf8VJCAiIgKnuf8S9L51rZb3DpnBp+qw6W/haFbDMuI+iMu1M/wCiie8ebWkge82CpegKReAj9PESMdY5B+G/+i5KHC75RmqnjlURwsP2opnv/lj+K/WUcedlrGPnEF9bY5Gst3Okic1pPgCQfcg6njfmf0/nF0cBvDTXib0L7/lHfEBvkwHvUeLNwjDpMbxeKCjGqWV4aL35uPM+A5k9AV9x2OOHGZ20H+E17msPVrTYOPiQL+9BschYb6XzpRRWuHTNLh9Vh1O/C0rf8Ysdkq+IVUKeRwZGWxANcR7DRq5H6epZ3AGiEmcJKicepTQPfq6F1m/yl/wUeYnWHEcSlmm9qR7nu83uJP8AFBJXAOGTEc7mSpe8sgic/dxtqdZgvv0c4+5bPiVxjkmqn0+UX6Im7OqBu55/y/ot+tzPdbv5HAcQdgHDOtkpjaWsmbTA94jiYXyEefaBh+14LiGtLnAN3J5BBmxxVGPVx7Js1RMdzYPkebd55krya+XDK31DJFMw221Me0j72lWv4cZQjyflyONrR27wHTv5lzyNxf6LeQHv5krluIHCM5tzI6pgqWQ6mtDm9kXElotqJ1DusPcgx+CfESXMLnUeOu1zsbqjkPN7Rza7q4XBv3i99xcxRxLx6Svz5WugkeGiUxgBxAtEAy4se/Tf3qS8B4VuyHiQxGesa9lMySRzREQSBC8EX1nuPRQPNKZpXOlN3OJJPUk3JQdDgedarAsOnZh0jmyTaQZS4lzWt1eqy/skl27uewtbmszIeZ24Hj8ldi5dNNHG7sWucS58j/VF3G9mhpeSfLvK3PCjhl/bAOnxVzo6RrtI07OkcOYaTyaNrut4DkbchnKOCHNFSzBWaII3mNg1OdfR6pdckn1iC73oPTNOcKvNVSXYvM4tvtG0kRt+yy9vebnqSvNuU612DGqFLN83A1dpoNtPPV1Lbb6uS6XgvlJuaM1Xr2h1PAO0e07hxJsxh8CbkjkQ0jvVoi0FtiBblbut0QU3yzmepyvXCTBpXMN7uZzY8Due3k4ff0IKs1RZ+hqOHxxJws1rCXx33EgOns7+LiADbk4FVVxJjY8RlFN7Ae4N+yHG33KT8gYTNmDhBilPQgl3bNkY36RYGOc0eJDAB42QcLmvN1VmutL8XlJbe7YwSI2eDW8vC536krb4LwtxLGsHFRRQt7Nw1MDpGtc8dxaCdge7VbryXFuaWOIeCCNiDzC73KnFuvy3QMhZ2U0LNmtlabtb9FrmkG3S97cuWyDiT2mG1x9uOWNxBsS1zXNNjy3BBVlOCecJcz5dkbi7tU1O4NMh5uY4EtLvEWcCfAE73Kj7B864LjGIuOaMMbE+Rxc6ZrnSNLnEkueNnNuT3By6fim6lyZkNzMqxxx/Py1hdGbh0YaSXA3IIIOnbukKDneJnF+Wtqn0+U5DHA0kOnbs+TroP5jehG56gbKL8MwyozBiBZh0ck8x9Y6QXHxc49w8SterbcM8pMyjliOPSO3kAfO7vLyPZv0b7IHmeZKCq+KYZPgVf2eJRyQyts4BwIPg4HvG3MdFK/DnitNHhVRT448ySMhe+mkdu9zmMJETjzcTbYnfYje4tnfKXjYGYe7/AKl5R5tHZ8/In7yomyTM6nzjQuhJ1Coj5eMjQR7xt70GDVvnEdqwy6T3PLrG3nzWIBqNm81L/wApHEu2zBSwN5RxF585XWt8Ix8VxHC/DfSuf6GM8hKJD5RAv389Nveg0sj6mGH8qZw0bb6wOluiwFY35RWJfNsoQwsNjNMLjq2NpJ/EWKA8u4f6Wx+mg3/KysYbdHvAJ+BQdLwvw2etzxRRyds2ISayPWDbRgyWPdYltvep5xOgklxcl7XFwLtJayQudq19npkA0Rho7Nvrcjrd6vtO7MCw2RB8bfSNXPvRfUQR5x4xL5hw9kaDYzSMiFvPWfdZhHvVYFN3ylMTvPRUzDyDpXD7RDWH7nqFaeF1TUNZCLucQ1o6lxsB8UEoYzhPo3gFSOcLOlqhM79ZkjWn9hrfiorVjONmHtwzhXDDD7ML4mN8mMc1V9wrD34tiUUFELySODGjxcbb9B3k9EEm8H8H9GYFX4vVD/Aie2nv9PQdTht4hgI+k8dyihWL4rwR5R4RMo6LZrnMhB5E2PaPcbfSLCT9pV0QSrkT/gvCDGKo31TEU7fIgNuP3zv2fBRUpUzofQvBrCaYH1qhxqHeLbFwv+9Z+yoxpKd1XVMjgF3PcGtHi42H3lB2+eMLdhvD7A9Q9tk0hNu+V0bh+DT8Fy2VZGQ5no3VZAjE8ZeTyDRI25Pha6sxxCyMMx5KbS0NmyQBpgvsLxt06T0Bbt52PcquYjQSYZWOixCN0cjTZzXCxH/3VBdOtqmUNI+SscGRsBc5x5AAXJKig8fKO+1LU/8Aj/8AZQZV5gqq3D2w1dTO+FvKN0jywW5bE227ui22S8iVeb6tooIy2G/rzuBEbR32P55+q3frYboJUzdxLZmThrXOw+GWIFzIA6TTZxkN3NbY7kMa6/2goDUwcbKGLK2WsOw7C/YBfK8n2nOADQ93Ukuf5WAGwUfZBwz0xnSihtcOmaXD6rDqd+FpQWsyhhAwHLFLTsAHZxtDrDm4i7z73Fx96pzVRuhqntqb6w4h1+dwd7+9XdVdONXD6XDcZlrcLjL6WUl8mkXMTzu4uH0CfW1cgSQbbXDoPk0yM+Z17RbtdUZPUts+3nY6vj4ru+KWbmZTyvI4OAqJWlkDe8uIsX26Mvcnlew7wqsYXic2EVYkwuV8Ug21McWmx7tuY8F9xDEJsZrdeISSTSna73Oc7nsBfu32AQdDl3D8KAa7MlZOe8xwQke4vdz9zfepby/xIwTKtCYMIZPEwOJcDG8uLuRLi51ydre6y5fhbwkkratlTmqMsgadTIHj1pCOWtv5rPA7npbnquMmRJsGzDPVUsbn0kzjIXtF9Dnm7mv+iNRJB5WIHMIO7EeB8VcXeymjlbVaDI6VjezcQC0Enm159Yc2krl898F/QOCy1OEVBkZENTo5GgO0jmQ4GxI52sO/yUX4Ni82B4g2bCZHRyt5Ob48wQdiPA7Le5i4i4hmPD+xxSovEbamtYxgdY3GrSATvvbltyQcouyzJLJU8OcIM9y1j6hjSb8tcZAv8QPBvgtZlDKFTm3EBHhUZ039eUg9mwdXHr9UblWHzNw4ixDh5HQYeQ10ADoXu2vIL3L7fT1Ov0Lr2NrIKz4HIyLGqd1XbsxKwvvy0h4v911dPWNF7i3O/dbqqVYthU2DVzocVjfHK3m1wt7x3OB7iNj3LKfmasfhQp3VU/zcC3Z9o7Ta1tNr+z9Xkg6bjJmxuac2H5i7VTwDs4yOTje73jwJ2HUNB7184LYC7G89wOLbxU57Z57gWewPMv07dA7oueyxlWqzTWiPBonP3s552jZ4vdyHW3PoCrNZPyxBw8ytJpILmtMs8p21FjST5NaL2HmeZKCvXFrEvSnEKtc03a1/ZDw7IBht+s0n3rq/k5Yb84zTUTu5RQ6f1pXC33Nf8VFVXUOq6p8k5u57i5x8XG5+8qw3ydMN+bZSnmcLGaawPVsbQB+IvQch8o/Ee3zNTQDlFDq/Wlcbj4Mb8Vo+BeHfP+IkLjyhY+U+5ukfieD7ln8fMCnpc5vqZGuNPM1ml4BLWljA0sJ7jduq31vNRxQ10uHVGvD5JInjbVG5zXb+IN0F2kXPcPYZIclUfpB8kkrog97pHOc+8nr2JJvtqt7l0KAiIg8ZqSOd952MceV3NBP3hfhuHxNcC2KMEcjob/RZKIPxNC2dlpmhw6EAj715R0UcTwYo2AjkQ1oP8FkIg85qdtQB27WuA5agD/FePo6H9FH+w3+iykQeMlIyQDtGMNhYXaDYdBtsvw3D4muBbFGCNwQxvd7lkogLBxTBqfGGAYrBFMBy7RjXW8rjb3LORBoKbJOHU0gdBQ0ocOR7Fht5XGy3zWhjQGAADkAvqIPGakZO687GOPK7mg/xC+RUUcTwYo2AjkQ1oPxsvdEBERBoK7JWH18xdV0VO5x3LuzaCfMgb+9ZWFZapMHffC6WCJ30mRtDv2rX+9bVEBCLjdEQaCuyVh9fIXVdFTFx5u7JoJ8yBcrwg4fYZA+7KGn/AFmBw+DrhdMiDzggbTQhtO1rWjk1oAA8gNgvREQYeJYVBi0OnFIYpW9JGNcB5XGy00eQMMjku2gpr+MbSPgdl0qIPOnp20sIbTNaxg5NaAAPIDYL9uaHtIeAQdiDyX1EGN6Pi/RR/sN/oveKMRMtEAB0AAC/SIPhGob8ljjDog64ijv10N/oslEAbDZERAREQEREBERAREQEREBERAREQEREBERAREQEREBERAREQEREBERAREQEREBERAREQEREBERAREQEREBERAREQEREBERAREQEREBERAREQEREBERAREQEREBERAREQEREBERAREQEREBERAREQEREBERAREQEREBERAREQEREBERAREQEREBERAREQEREBERAREQEREBERAREQEREBERAREQEREBERAREQEREBERAREQEREBERAREQf/Z"/>
+          <p:cNvSpPr>
+            <a:spLocks noChangeAspect="1" noChangeArrowheads="1"/>
+          </p:cNvSpPr>
+          <p:nvPr/>
+        </p:nvSpPr>
+        <p:spPr bwMode="auto">
+          <a:xfrm>
+            <a:off x="155575" y="-144463"/>
+            <a:ext cx="304800" cy="304801"/>
+          </a:xfrm>
+          <a:prstGeom prst="rect">
+            <a:avLst/>
+          </a:prstGeom>
+          <a:noFill/>
+          <a:extLst>
+            <a:ext uri="{909E8E84-426E-40DD-AFC4-6F175D3DCCD1}">
+              <a14:hiddenFill xmlns:a14="http://schemas.microsoft.com/office/drawing/2010/main">
+                <a:solidFill>
+                  <a:srgbClr val="FFFFFF"/>
+                </a:solidFill>
+              </a14:hiddenFill>
+            </a:ext>
+          </a:extLst>
+        </p:spPr>
+        <p:txBody>
+          <a:bodyPr vert="horz" wrap="square" lIns="91440" tIns="45720" rIns="91440" bIns="45720" numCol="1" anchor="t" anchorCtr="0" compatLnSpc="1">
+            <a:prstTxWarp prst="textNoShape">
+              <a:avLst/>
+            </a:prstTxWarp>
+          </a:bodyPr>
+          <a:lstStyle/>
+          <a:p>
+            <a:endParaRPr lang="en-CA"/>
+          </a:p>
+        </p:txBody>
+      </p:sp>
       <p:pic>
         <p:nvPicPr>
-          <p:cNvPr id="1030" name="Picture 6" descr="Rene Spronk"/>
+          <p:cNvPr id="1040" name="Picture 16" descr="File:KeizersgrachtReguliersgrachtAmsterdam.jpg"/>
           <p:cNvPicPr>
             <a:picLocks noChangeAspect="1" noChangeArrowheads="1"/>
           </p:cNvPicPr>
@@ -31239,8 +31270,8 @@
         </p:blipFill>
         <p:spPr bwMode="auto">
           <a:xfrm>
-            <a:off x="1988872" y="5713290"/>
-            <a:ext cx="687600" cy="687600"/>
+            <a:off x="4139952" y="1412776"/>
+            <a:ext cx="4392623" cy="2926586"/>
           </a:xfrm>
           <a:prstGeom prst="rect">
             <a:avLst/>
@@ -31259,14 +31290,14 @@
       </p:pic>
       <p:pic>
         <p:nvPicPr>
-          <p:cNvPr id="1032" name="Picture 8" descr="http://www.persberichtonline.nl/wp-content/uploads/logo-rood3.jpg"/>
+          <p:cNvPr id="1026" name="Picture 2" descr="Home"/>
           <p:cNvPicPr>
             <a:picLocks noChangeAspect="1" noChangeArrowheads="1"/>
           </p:cNvPicPr>
           <p:nvPr/>
         </p:nvPicPr>
         <p:blipFill>
-          <a:blip r:embed="rId6" cstate="print">
+          <a:blip r:embed="rId6">
             <a:extLst>
               <a:ext uri="{28A0092B-C50C-407E-A947-70E740481C1C}">
                 <a14:useLocalDpi xmlns:a14="http://schemas.microsoft.com/office/drawing/2010/main" val="0"/>
@@ -31280,8 +31311,8 @@
         </p:blipFill>
         <p:spPr bwMode="auto">
           <a:xfrm>
-            <a:off x="2812386" y="5790227"/>
-            <a:ext cx="1800200" cy="533727"/>
+            <a:off x="1988872" y="5713290"/>
+            <a:ext cx="2924175" cy="819150"/>
           </a:xfrm>
           <a:prstGeom prst="rect">
             <a:avLst/>
@@ -31300,46 +31331,71 @@
       </p:pic>
       <p:sp>
         <p:nvSpPr>
-          <p:cNvPr id="7" name="AutoShape 10" descr="data:image/jpeg;base64,/9j/4AAQSkZJRgABAQAAAQABAAD/2wCEAAkGBxQHBhIUBxMUFhIXGSIZFxcXFxgcGhwfFxccIB8cGh8gHTQgGB8mIRwbIjEhJSkvLjouHCAzODUsNygtLisBCgoKBQUFDgUFDisZExkrKysrKysrKysrKysrKysrKysrKysrKysrKysrKysrKysrKysrKysrKysrKysrKysrK//AABEIALcBEwMBIgACEQEDEQH/xAAcAAEAAgMBAQEAAAAAAAAAAAAABwgEBQYDAQL/xABHEAABAwIEAwQFBwkGBwEAAAABAAIDBBEFBhIhBzFRE0FhcRUiMoGRCBRSYnKhoiNCU4KSk7Gy0RYXM2PB0yU1Q3Oj0vAk/8QAFAEBAAAAAAAAAAAAAAAAAAAAAP/EABQRAQAAAAAAAAAAAAAAAAAAAAD/2gAMAwEAAhEDEQA/AJwREQEREBERAREQEREBERAREQEREBERAREQEREBERAREQEREBERAREQEREBERAREQEREBERAREQEREBERAREQEREBERAREQEREBERAREQEREBERAREQEREBERAREQEREBERAREQEREBERAREQEREBERAREQEREBERAREQEREBERAREQEREBERAREQEREBERAREQEREBERAREQEREBERAREQEREBERAREQEREBERAREQEREBERAXK55z7TZJEPpVszjLq0iJrSfU03J1PFvaH3rqlW75Q2J/O87MiadoIWgjo55Lj+EsQd5/fzh36Gt/dw/7y32TOJ9JnHFjBhkdQ14YX3kbGG2aWj82Qm/rDuVVFJnyfHac/nxgePvYf9EFllGWIccMOoq6SPs6p+hxbrYyIsdpNrtJlBIPcbLc8W8z/wBmMmyugNp5fyUXUFwN3fqtub9dPVVRQWN/v5w79DW/u4f95dBX8TKWgyjT19RHUdjO8sYzTH2m2v1iO0tp9Q76u9vVVSVl8z8MH5iyzhtMypELaWLS4dnr1uLGAn2ha2l37RQYv9/OHfoa393D/vKU4n9pEDYi4vY8xccj4qFcO4B/NcQifPWtexr2uczsCNQa4Etv2m1xteymxAReVRUspheoe1o+s4D+K+U9UypH/wCZ7HfZcD/BB7IiICIvhcA4AkXPJB9Rfl7xGwmQgAcydgtQ/NtBHLpfXUgdysaiK9+ltSDcovOCdtREHU7muaeRaQQfIheiAi/MkgiYTIQAOZJsAtNLnDD4XkS19ICOYM8Vx5+tsg3aLCw7F6fFBfDJ4ZR/lyMf/KVmoCIsHEcZp8L/AOZ1EMX/AHJGM/mKDORa/D8dpcUfbDamCU9I5WPP4StggLmMx8QMPy3UGPFalolHONoc9w2v6waDp233tzWVnnG/7OZSqqlltUbPUuLjW4hrLjvGpwVPZpXTzOdO4uc4kuc4kkkm5JJ3JJ70FqsA4o4fj+LR0+GvlMshIaDG4A2aSd+7YErtVD/B7hv6EbBiWIy+u6IvbFp2YJG7EuJuToO4sLXI3UMYtmmpr8UmlZUTtEkjnholeANTibAA2Fr2QXHRRvwFildkkzV73vdNK4tL3OcdLLMtufpNf8VJCAiIgKnuf8S9L51rZb3DpnBp+qw6W/haFbDMuI+iMu1M/wCiie8ebWkge82CpegKReAj9PESMdY5B+G/+i5KHC75RmqnjlURwsP2opnv/lj+K/WUcedlrGPnEF9bY5Gst3Okic1pPgCQfcg6njfmf0/nF0cBvDTXib0L7/lHfEBvkwHvUeLNwjDpMbxeKCjGqWV4aL35uPM+A5k9AV9x2OOHGZ20H+E17msPVrTYOPiQL+9BschYb6XzpRRWuHTNLh9Vh1O/C0rf8Ysdkq+IVUKeRwZGWxANcR7DRq5H6epZ3AGiEmcJKicepTQPfq6F1m/yl/wUeYnWHEcSlmm9qR7nu83uJP8AFBJXAOGTEc7mSpe8sgic/dxtqdZgvv0c4+5bPiVxjkmqn0+UX6Im7OqBu55/y/ot+tzPdbv5HAcQdgHDOtkpjaWsmbTA94jiYXyEefaBh+14LiGtLnAN3J5BBmxxVGPVx7Js1RMdzYPkebd55krya+XDK31DJFMw221Me0j72lWv4cZQjyflyONrR27wHTv5lzyNxf6LeQHv5krluIHCM5tzI6pgqWQ6mtDm9kXElotqJ1DusPcgx+CfESXMLnUeOu1zsbqjkPN7Rza7q4XBv3i99xcxRxLx6Svz5WugkeGiUxgBxAtEAy4se/Tf3qS8B4VuyHiQxGesa9lMySRzREQSBC8EX1nuPRQPNKZpXOlN3OJJPUk3JQdDgedarAsOnZh0jmyTaQZS4lzWt1eqy/skl27uewtbmszIeZ24Hj8ldi5dNNHG7sWucS58j/VF3G9mhpeSfLvK3PCjhl/bAOnxVzo6RrtI07OkcOYaTyaNrut4DkbchnKOCHNFSzBWaII3mNg1OdfR6pdckn1iC73oPTNOcKvNVSXYvM4tvtG0kRt+yy9vebnqSvNuU612DGqFLN83A1dpoNtPPV1Lbb6uS6XgvlJuaM1Xr2h1PAO0e07hxJsxh8CbkjkQ0jvVoi0FtiBblbut0QU3yzmepyvXCTBpXMN7uZzY8Due3k4ff0IKs1RZ+hqOHxxJws1rCXx33EgOns7+LiADbk4FVVxJjY8RlFN7Ae4N+yHG33KT8gYTNmDhBilPQgl3bNkY36RYGOc0eJDAB42QcLmvN1VmutL8XlJbe7YwSI2eDW8vC536krb4LwtxLGsHFRRQt7Nw1MDpGtc8dxaCdge7VbryXFuaWOIeCCNiDzC73KnFuvy3QMhZ2U0LNmtlabtb9FrmkG3S97cuWyDiT2mG1x9uOWNxBsS1zXNNjy3BBVlOCecJcz5dkbi7tU1O4NMh5uY4EtLvEWcCfAE73Kj7B864LjGIuOaMMbE+Rxc6ZrnSNLnEkueNnNuT3By6fim6lyZkNzMqxxx/Py1hdGbh0YaSXA3IIIOnbukKDneJnF+Wtqn0+U5DHA0kOnbs+TroP5jehG56gbKL8MwyozBiBZh0ck8x9Y6QXHxc49w8SterbcM8pMyjliOPSO3kAfO7vLyPZv0b7IHmeZKCq+KYZPgVf2eJRyQyts4BwIPg4HvG3MdFK/DnitNHhVRT448ySMhe+mkdu9zmMJETjzcTbYnfYje4tnfKXjYGYe7/AKl5R5tHZ8/In7yomyTM6nzjQuhJ1Coj5eMjQR7xt70GDVvnEdqwy6T3PLrG3nzWIBqNm81L/wApHEu2zBSwN5RxF585XWt8Ix8VxHC/DfSuf6GM8hKJD5RAv389Nveg0sj6mGH8qZw0bb6wOluiwFY35RWJfNsoQwsNjNMLjq2NpJ/EWKA8u4f6Wx+mg3/KysYbdHvAJ+BQdLwvw2etzxRRyds2ISayPWDbRgyWPdYltvep5xOgklxcl7XFwLtJayQudq19npkA0Rho7Nvrcjrd6vtO7MCw2RB8bfSNXPvRfUQR5x4xL5hw9kaDYzSMiFvPWfdZhHvVYFN3ylMTvPRUzDyDpXD7RDWH7nqFaeF1TUNZCLucQ1o6lxsB8UEoYzhPo3gFSOcLOlqhM79ZkjWn9hrfiorVjONmHtwzhXDDD7ML4mN8mMc1V9wrD34tiUUFELySODGjxcbb9B3k9EEm8H8H9GYFX4vVD/Aie2nv9PQdTht4hgI+k8dyihWL4rwR5R4RMo6LZrnMhB5E2PaPcbfSLCT9pV0QSrkT/gvCDGKo31TEU7fIgNuP3zv2fBRUpUzofQvBrCaYH1qhxqHeLbFwv+9Z+yoxpKd1XVMjgF3PcGtHi42H3lB2+eMLdhvD7A9Q9tk0hNu+V0bh+DT8Fy2VZGQ5no3VZAjE8ZeTyDRI25Pha6sxxCyMMx5KbS0NmyQBpgvsLxt06T0Bbt52PcquYjQSYZWOixCN0cjTZzXCxH/3VBdOtqmUNI+SscGRsBc5x5AAXJKig8fKO+1LU/8Aj/8AZQZV5gqq3D2w1dTO+FvKN0jywW5bE227ui22S8iVeb6tooIy2G/rzuBEbR32P55+q3frYboJUzdxLZmThrXOw+GWIFzIA6TTZxkN3NbY7kMa6/2goDUwcbKGLK2WsOw7C/YBfK8n2nOADQ93Ukuf5WAGwUfZBwz0xnSihtcOmaXD6rDqd+FpQWsyhhAwHLFLTsAHZxtDrDm4i7z73Fx96pzVRuhqntqb6w4h1+dwd7+9XdVdONXD6XDcZlrcLjL6WUl8mkXMTzu4uH0CfW1cgSQbbXDoPk0yM+Z17RbtdUZPUts+3nY6vj4ru+KWbmZTyvI4OAqJWlkDe8uIsX26Mvcnlew7wqsYXic2EVYkwuV8Ug21McWmx7tuY8F9xDEJsZrdeISSTSna73Oc7nsBfu32AQdDl3D8KAa7MlZOe8xwQke4vdz9zfepby/xIwTKtCYMIZPEwOJcDG8uLuRLi51ydre6y5fhbwkkratlTmqMsgadTIHj1pCOWtv5rPA7npbnquMmRJsGzDPVUsbn0kzjIXtF9Dnm7mv+iNRJB5WIHMIO7EeB8VcXeymjlbVaDI6VjezcQC0Enm159Yc2krl898F/QOCy1OEVBkZENTo5GgO0jmQ4GxI52sO/yUX4Ni82B4g2bCZHRyt5Ob48wQdiPA7Le5i4i4hmPD+xxSovEbamtYxgdY3GrSATvvbltyQcouyzJLJU8OcIM9y1j6hjSb8tcZAv8QPBvgtZlDKFTm3EBHhUZ039eUg9mwdXHr9UblWHzNw4ixDh5HQYeQ10ADoXu2vIL3L7fT1Ov0Lr2NrIKz4HIyLGqd1XbsxKwvvy0h4v911dPWNF7i3O/dbqqVYthU2DVzocVjfHK3m1wt7x3OB7iNj3LKfmasfhQp3VU/zcC3Z9o7Ta1tNr+z9Xkg6bjJmxuac2H5i7VTwDs4yOTje73jwJ2HUNB7184LYC7G89wOLbxU57Z57gWewPMv07dA7oueyxlWqzTWiPBonP3s552jZ4vdyHW3PoCrNZPyxBw8ytJpILmtMs8p21FjST5NaL2HmeZKCvXFrEvSnEKtc03a1/ZDw7IBht+s0n3rq/k5Yb84zTUTu5RQ6f1pXC33Nf8VFVXUOq6p8k5u57i5x8XG5+8qw3ydMN+bZSnmcLGaawPVsbQB+IvQch8o/Ee3zNTQDlFDq/Wlcbj4Mb8Vo+BeHfP+IkLjyhY+U+5ukfieD7ln8fMCnpc5vqZGuNPM1ml4BLWljA0sJ7jduq31vNRxQ10uHVGvD5JInjbVG5zXb+IN0F2kXPcPYZIclUfpB8kkrog97pHOc+8nr2JJvtqt7l0KAiIg8ZqSOd952MceV3NBP3hfhuHxNcC2KMEcjob/RZKIPxNC2dlpmhw6EAj715R0UcTwYo2AjkQ1oP8FkIg85qdtQB27WuA5agD/FePo6H9FH+w3+iykQeMlIyQDtGMNhYXaDYdBtsvw3D4muBbFGCNwQxvd7lkogLBxTBqfGGAYrBFMBy7RjXW8rjb3LORBoKbJOHU0gdBQ0ocOR7Fht5XGy3zWhjQGAADkAvqIPGakZO687GOPK7mg/xC+RUUcTwYo2AjkQ1oPxsvdEBERBoK7JWH18xdV0VO5x3LuzaCfMgb+9ZWFZapMHffC6WCJ30mRtDv2rX+9bVEBCLjdEQaCuyVh9fIXVdFTFx5u7JoJ8yBcrwg4fYZA+7KGn/AFmBw+DrhdMiDzggbTQhtO1rWjk1oAA8gNgvREQYeJYVBi0OnFIYpW9JGNcB5XGy00eQMMjku2gpr+MbSPgdl0qIPOnp20sIbTNaxg5NaAAPIDYL9uaHtIeAQdiDyX1EGN6Pi/RR/sN/oveKMRMtEAB0AAC/SIPhGob8ljjDog64ijv10N/oslEAbDZERAREQEREBERAREQEREBERAREQEREBERAREQEREBERAREQEREBERAREQEREBERAREQEREBERAREQEREBERAREQEREBERAREQEREBERAREQEREBERAREQEREBERAREQEREBERAREQEREBERAREQEREBERAREQEREBERAREQEREBERAREQEREBERAREQEREBERAREQEREBERAREQEREBERAREQEREBERAREQEREBERAREQEREBERAREQf/Z"/>
-          <p:cNvSpPr>
-            <a:spLocks noChangeAspect="1" noChangeArrowheads="1"/>
-          </p:cNvSpPr>
+          <p:cNvPr id="2" name="Rectangle 1"/>
+          <p:cNvSpPr/>
           <p:nvPr/>
         </p:nvSpPr>
         <p:spPr bwMode="auto">
           <a:xfrm>
-            <a:off x="155575" y="-144463"/>
-            <a:ext cx="304800" cy="304801"/>
+            <a:off x="2828757" y="5713290"/>
+            <a:ext cx="2084290" cy="701499"/>
           </a:xfrm>
           <a:prstGeom prst="rect">
             <a:avLst/>
           </a:prstGeom>
-          <a:noFill/>
-          <a:extLst>
-            <a:ext uri="{909E8E84-426E-40DD-AFC4-6F175D3DCCD1}">
-              <a14:hiddenFill xmlns:a14="http://schemas.microsoft.com/office/drawing/2010/main">
-                <a:solidFill>
-                  <a:srgbClr val="FFFFFF"/>
-                </a:solidFill>
-              </a14:hiddenFill>
-            </a:ext>
-          </a:extLst>
+          <a:solidFill>
+            <a:schemeClr val="bg1"/>
+          </a:solidFill>
+          <a:ln w="9525" cap="flat" cmpd="sng" algn="ctr">
+            <a:noFill/>
+            <a:prstDash val="solid"/>
+            <a:round/>
+            <a:headEnd type="none" w="med" len="med"/>
+            <a:tailEnd type="none" w="med" len="med"/>
+          </a:ln>
+          <a:effectLst/>
+          <a:extLst/>
         </p:spPr>
         <p:txBody>
-          <a:bodyPr vert="horz" wrap="square" lIns="91440" tIns="45720" rIns="91440" bIns="45720" numCol="1" anchor="t" anchorCtr="0" compatLnSpc="1">
+          <a:bodyPr vert="horz" wrap="square" lIns="91440" tIns="45720" rIns="91440" bIns="45720" numCol="1" rtlCol="0" anchor="t" anchorCtr="0" compatLnSpc="1">
             <a:prstTxWarp prst="textNoShape">
               <a:avLst/>
             </a:prstTxWarp>
           </a:bodyPr>
           <a:lstStyle/>
           <a:p>
-            <a:endParaRPr lang="en-CA"/>
+            <a:pPr marL="0" marR="0" indent="0" algn="l" defTabSz="914400" rtl="0" eaLnBrk="0" fontAlgn="base" latinLnBrk="0" hangingPunct="0">
+              <a:lnSpc>
+                <a:spcPct val="100000"/>
+              </a:lnSpc>
+              <a:spcBef>
+                <a:spcPct val="0"/>
+              </a:spcBef>
+              <a:spcAft>
+                <a:spcPct val="0"/>
+              </a:spcAft>
+              <a:buClrTx/>
+              <a:buSzTx/>
+              <a:buFontTx/>
+              <a:buNone/>
+              <a:tabLst/>
+            </a:pPr>
+            <a:endParaRPr kumimoji="0" lang="en-CA" sz="1800" b="0" i="0" u="none" strike="noStrike" cap="none" normalizeH="0" baseline="0">
+              <a:ln>
+                <a:noFill/>
+              </a:ln>
+              <a:solidFill>
+                <a:schemeClr val="tx1"/>
+              </a:solidFill>
+              <a:effectLst/>
+              <a:latin typeface="Arial" charset="0"/>
+            </a:endParaRPr>
           </a:p>
         </p:txBody>
       </p:sp>
       <p:pic>
         <p:nvPicPr>
-          <p:cNvPr id="1040" name="Picture 16" descr="File:KeizersgrachtReguliersgrachtAmsterdam.jpg"/>
+          <p:cNvPr id="1032" name="Picture 8" descr="http://www.persberichtonline.nl/wp-content/uploads/logo-rood3.jpg"/>
           <p:cNvPicPr>
             <a:picLocks noChangeAspect="1" noChangeArrowheads="1"/>
           </p:cNvPicPr>
@@ -31360,8 +31416,8 @@
         </p:blipFill>
         <p:spPr bwMode="auto">
           <a:xfrm>
-            <a:off x="4139952" y="1412776"/>
-            <a:ext cx="4392623" cy="2926586"/>
+            <a:off x="2907174" y="5790226"/>
+            <a:ext cx="1800200" cy="533727"/>
           </a:xfrm>
           <a:prstGeom prst="rect">
             <a:avLst/>

</xml_diff>